<commit_message>
feat: Add shared Python module for generating PowerPoint slides with formatted tables and charts.
</commit_message>
<xml_diff>
--- a/test_evolution_debug.pptx
+++ b/test_evolution_debug.pptx
@@ -280,7 +280,9 @@
       </c:catAx>
       <c:valAx>
         <c:axId val="2140495176"/>
-        <c:scaling/>
+        <c:scaling>
+          <c:min val="0.0"/>
+        </c:scaling>
         <c:delete val="0"/>
         <c:axPos val="l"/>
         <c:numFmt formatCode="&quot;$&quot; #,##0" sourceLinked="0"/>

</xml_diff>

<commit_message>
feat: introduce shared PowerPoint generation utilities for creating slides, tables, and charts.
</commit_message>
<xml_diff>
--- a/test_evolution_debug.pptx
+++ b/test_evolution_debug.pptx
@@ -139,7 +139,8 @@
             <a:ln w="31750"/>
           </c:spPr>
           <c:marker>
-            <c:symbol val="none"/>
+            <c:symbol val="circle"/>
+            <c:size val="7"/>
           </c:marker>
           <c:cat>
             <c:strRef>
@@ -202,7 +203,8 @@
             <a:ln w="31750"/>
           </c:spPr>
           <c:marker>
-            <c:symbol val="none"/>
+            <c:symbol val="circle"/>
+            <c:size val="7"/>
           </c:marker>
           <c:cat>
             <c:strRef>
@@ -280,9 +282,7 @@
       </c:catAx>
       <c:valAx>
         <c:axId val="2140495176"/>
-        <c:scaling>
-          <c:min val="0.0"/>
-        </c:scaling>
+        <c:scaling/>
         <c:delete val="0"/>
         <c:axPos val="l"/>
         <c:numFmt formatCode="&quot;$&quot; #,##0" sourceLinked="0"/>
@@ -294,9 +294,9 @@
       </c:valAx>
     </c:plotArea>
     <c:legend>
-      <c:legendPos val="b"/>
+      <c:legendPos val="t"/>
       <c:layout/>
-      <c:overlay val="0"/>
+      <c:overlay val="1"/>
       <c:txPr>
         <a:bodyPr/>
         <a:lstStyle/>

</xml_diff>

<commit_message>
feat: Introduce `ppt_shared.py` with common PowerPoint slide, table, and chart generation utilities.
</commit_message>
<xml_diff>
--- a/test_evolution_debug.pptx
+++ b/test_evolution_debug.pptx
@@ -144,9 +144,9 @@
           </c:marker>
           <c:cat>
             <c:strRef>
-              <c:f>Sheet1!$A$2:$A$5</c:f>
+              <c:f>Sheet1!$A$2:$A$6</c:f>
               <c:strCache>
-                <c:ptCount val="4"/>
+                <c:ptCount val="5"/>
                 <c:pt idx="0">
                   <c:v>2025-01-01</c:v>
                 </c:pt>
@@ -159,26 +159,29 @@
                 <c:pt idx="3">
                   <c:v>2025-04-01</c:v>
                 </c:pt>
+                <c:pt idx="4">
+                  <c:v>2025-05-01</c:v>
+                </c:pt>
               </c:strCache>
             </c:strRef>
           </c:cat>
           <c:val>
             <c:numRef>
-              <c:f>Sheet1!$B$2:$B$5</c:f>
+              <c:f>Sheet1!$B$2:$B$6</c:f>
               <c:numCache>
                 <c:formatCode>General</c:formatCode>
-                <c:ptCount val="4"/>
+                <c:ptCount val="5"/>
                 <c:pt idx="0">
                   <c:v>25000000.0</c:v>
                 </c:pt>
                 <c:pt idx="1">
                   <c:v>25200000.0</c:v>
                 </c:pt>
-                <c:pt idx="2">
-                  <c:v>25500000.0</c:v>
-                </c:pt>
                 <c:pt idx="3">
                   <c:v>26000000.0</c:v>
+                </c:pt>
+                <c:pt idx="4">
+                  <c:v>26200000.0</c:v>
                 </c:pt>
               </c:numCache>
             </c:numRef>
@@ -208,9 +211,9 @@
           </c:marker>
           <c:cat>
             <c:strRef>
-              <c:f>Sheet1!$A$2:$A$5</c:f>
+              <c:f>Sheet1!$A$2:$A$6</c:f>
               <c:strCache>
-                <c:ptCount val="4"/>
+                <c:ptCount val="5"/>
                 <c:pt idx="0">
                   <c:v>2025-01-01</c:v>
                 </c:pt>
@@ -223,18 +226,18 @@
                 <c:pt idx="3">
                   <c:v>2025-04-01</c:v>
                 </c:pt>
+                <c:pt idx="4">
+                  <c:v>2025-05-01</c:v>
+                </c:pt>
               </c:strCache>
             </c:strRef>
           </c:cat>
           <c:val>
             <c:numRef>
-              <c:f>Sheet1!$C$2:$C$5</c:f>
+              <c:f>Sheet1!$C$2:$C$6</c:f>
               <c:numCache>
                 <c:formatCode>General</c:formatCode>
-                <c:ptCount val="4"/>
-                <c:pt idx="0">
-                  <c:v>24500000.0</c:v>
-                </c:pt>
+                <c:ptCount val="5"/>
                 <c:pt idx="1">
                   <c:v>24600000.0</c:v>
                 </c:pt>
@@ -3714,7 +3717,7 @@
         </p:nvGraphicFramePr>
         <p:xfrm>
           <a:off x="457200" y="1371600"/>
-          <a:ext cx="8229600" cy="1828800"/>
+          <a:ext cx="8229600" cy="2194560"/>
         </p:xfrm>
         <a:graphic>
           <a:graphicData uri="http://schemas.openxmlformats.org/drawingml/2006/table">
@@ -3847,7 +3850,7 @@
                         </a:defRPr>
                       </a:pPr>
                       <a:r>
-                        <a:t>$ 24.500.000</a:t>
+                        <a:t>$ 0</a:t>
                       </a:r>
                     </a:p>
                   </a:txBody>
@@ -3936,7 +3939,7 @@
                         </a:defRPr>
                       </a:pPr>
                       <a:r>
-                        <a:t>$ 25.500.000</a:t>
+                        <a:t>$ 0</a:t>
                       </a:r>
                     </a:p>
                   </a:txBody>
@@ -4007,6 +4010,59 @@
                       </a:pPr>
                       <a:r>
                         <a:t>$ 25.000.000</a:t>
+                      </a:r>
+                    </a:p>
+                  </a:txBody>
+                  <a:tcPr/>
+                </a:tc>
+              </a:tr>
+              <a:tr h="365760">
+                <a:tc>
+                  <a:txBody>
+                    <a:bodyPr/>
+                    <a:lstStyle/>
+                    <a:p>
+                      <a:pPr algn="l">
+                        <a:defRPr sz="900">
+                          <a:latin typeface="Avenir Medium"/>
+                        </a:defRPr>
+                      </a:pPr>
+                      <a:r>
+                        <a:t>2025-05-01</a:t>
+                      </a:r>
+                    </a:p>
+                  </a:txBody>
+                  <a:tcPr/>
+                </a:tc>
+                <a:tc>
+                  <a:txBody>
+                    <a:bodyPr/>
+                    <a:lstStyle/>
+                    <a:p>
+                      <a:pPr algn="r">
+                        <a:defRPr sz="900">
+                          <a:latin typeface="Avenir Medium"/>
+                        </a:defRPr>
+                      </a:pPr>
+                      <a:r>
+                        <a:t>$ 26.200.000</a:t>
+                      </a:r>
+                    </a:p>
+                  </a:txBody>
+                  <a:tcPr/>
+                </a:tc>
+                <a:tc>
+                  <a:txBody>
+                    <a:bodyPr/>
+                    <a:lstStyle/>
+                    <a:p>
+                      <a:pPr algn="r">
+                        <a:defRPr sz="900">
+                          <a:latin typeface="Avenir Medium"/>
+                        </a:defRPr>
+                      </a:pPr>
+                      <a:r>
+                        <a:t>$ 0</a:t>
                       </a:r>
                     </a:p>
                   </a:txBody>

</xml_diff>